<commit_message>
Correct the typo and add the yolo train command and yolo test command
</commit_message>
<xml_diff>
--- a/EE6008_48_UAV_week4.pptx
+++ b/EE6008_48_UAV_week4.pptx
@@ -289,7 +289,7 @@
       <p15:sldGuideLst xmlns:p15="http://schemas.microsoft.com/office/powerpoint/2012/main"/>
     </p:ext>
     <p:ext uri="GoogleSlidesCustomDataVersion2">
-      <go:slidesCustomData xmlns:go="http://customooxmlschemas.google.com/" xmlns:ahyp="http://schemas.microsoft.com/office/drawing/2018/hyperlinkcolor" xmlns:p15="http://schemas.microsoft.com/office/powerpoint/2012/main" xmlns:p14="http://schemas.microsoft.com/office/powerpoint/2010/main" xmlns:com="http://schemas.openxmlformats.org/drawingml/2006/compatibility" xmlns:pvml="urn:schemas-microsoft-com:office:powerpoint" xmlns:v="urn:schemas-microsoft-com:vml" xmlns:o="urn:schemas-microsoft-com:office:office" xmlns:dgm="http://schemas.openxmlformats.org/drawingml/2006/diagram" xmlns:c="http://schemas.openxmlformats.org/drawingml/2006/chart" xmlns:mv="urn:schemas-microsoft-com:mac:vml" xmlns:mc="http://schemas.openxmlformats.org/markup-compatibility/2006" xmlns="" r:id="rId42" roundtripDataSignature="AMtx7mg95ozjZ+8hzLEFS2DFFpARxD+ThA=="/>
+      <go:slidesCustomData xmlns="" xmlns:mc="http://schemas.openxmlformats.org/markup-compatibility/2006" xmlns:mv="urn:schemas-microsoft-com:mac:vml" xmlns:c="http://schemas.openxmlformats.org/drawingml/2006/chart" xmlns:dgm="http://schemas.openxmlformats.org/drawingml/2006/diagram" xmlns:o="urn:schemas-microsoft-com:office:office" xmlns:v="urn:schemas-microsoft-com:vml" xmlns:pvml="urn:schemas-microsoft-com:office:powerpoint" xmlns:com="http://schemas.openxmlformats.org/drawingml/2006/compatibility" xmlns:p14="http://schemas.microsoft.com/office/powerpoint/2010/main" xmlns:p15="http://schemas.microsoft.com/office/powerpoint/2012/main" xmlns:ahyp="http://schemas.microsoft.com/office/drawing/2018/hyperlinkcolor" xmlns:go="http://customooxmlschemas.google.com/" r:id="rId42" roundtripDataSignature="AMtx7mg95ozjZ+8hzLEFS2DFFpARxD+ThA=="/>
     </p:ext>
   </p:extLst>
 </p:presentation>
@@ -15098,8 +15098,8 @@
         </p:nvSpPr>
         <p:spPr>
           <a:xfrm>
-            <a:off x="6338820" y="2388795"/>
-            <a:ext cx="5411717" cy="4154943"/>
+            <a:off x="6170673" y="2910468"/>
+            <a:ext cx="5411717" cy="3785611"/>
           </a:xfrm>
           <a:prstGeom prst="rect">
             <a:avLst/>
@@ -15136,75 +15136,6 @@
               </a:rPr>
               <a:t>EE6008-48 Group</a:t>
             </a:r>
-          </a:p>
-          <a:p>
-            <a:pPr marL="0" marR="0" lvl="0" indent="0" algn="l" rtl="0">
-              <a:spcBef>
-                <a:spcPts val="0"/>
-              </a:spcBef>
-              <a:spcAft>
-                <a:spcPts val="0"/>
-              </a:spcAft>
-              <a:buNone/>
-            </a:pPr>
-            <a:r>
-              <a:rPr lang="en-US" altLang="zh-CN" sz="2400" dirty="0">
-                <a:solidFill>
-                  <a:schemeClr val="dk1"/>
-                </a:solidFill>
-                <a:latin typeface="Microsoft GothicNeo" panose="020B0500000101010101" pitchFamily="34" charset="-127"/>
-                <a:ea typeface="Microsoft GothicNeo" panose="020B0500000101010101" pitchFamily="34" charset="-127"/>
-                <a:cs typeface="Microsoft GothicNeo" panose="020B0500000101010101" pitchFamily="34" charset="-127"/>
-                <a:sym typeface="Libre Franklin"/>
-              </a:rPr>
-              <a:t>Dear Mentors: </a:t>
-            </a:r>
-          </a:p>
-          <a:p>
-            <a:pPr marL="0" marR="0" lvl="0" indent="0" algn="l" rtl="0">
-              <a:spcBef>
-                <a:spcPts val="0"/>
-              </a:spcBef>
-              <a:spcAft>
-                <a:spcPts val="0"/>
-              </a:spcAft>
-              <a:buNone/>
-            </a:pPr>
-            <a:r>
-              <a:rPr lang="en-US" altLang="zh-CN" sz="2400" dirty="0">
-                <a:solidFill>
-                  <a:schemeClr val="dk1"/>
-                </a:solidFill>
-                <a:latin typeface="Microsoft GothicNeo" panose="020B0500000101010101" pitchFamily="34" charset="-127"/>
-                <a:ea typeface="Microsoft GothicNeo" panose="020B0500000101010101" pitchFamily="34" charset="-127"/>
-                <a:cs typeface="Microsoft GothicNeo" panose="020B0500000101010101" pitchFamily="34" charset="-127"/>
-                <a:sym typeface="Libre Franklin"/>
-              </a:rPr>
-              <a:t>Jianjun</a:t>
-            </a:r>
-          </a:p>
-          <a:p>
-            <a:pPr marL="0" marR="0" lvl="0" indent="0" algn="l" rtl="0">
-              <a:spcBef>
-                <a:spcPts val="0"/>
-              </a:spcBef>
-              <a:spcAft>
-                <a:spcPts val="0"/>
-              </a:spcAft>
-              <a:buNone/>
-            </a:pPr>
-            <a:r>
-              <a:rPr lang="en-US" altLang="zh-CN" sz="2400" dirty="0" err="1">
-                <a:solidFill>
-                  <a:schemeClr val="dk1"/>
-                </a:solidFill>
-                <a:latin typeface="Microsoft GothicNeo" panose="020B0500000101010101" pitchFamily="34" charset="-127"/>
-                <a:ea typeface="Microsoft GothicNeo" panose="020B0500000101010101" pitchFamily="34" charset="-127"/>
-                <a:cs typeface="Microsoft GothicNeo" panose="020B0500000101010101" pitchFamily="34" charset="-127"/>
-                <a:sym typeface="Libre Franklin"/>
-              </a:rPr>
-              <a:t>Ruoyu</a:t>
-            </a:r>
             <a:endParaRPr lang="en-US" altLang="zh-CN" sz="2400" dirty="0">
               <a:solidFill>
                 <a:schemeClr val="dk1"/>
@@ -15214,6 +15145,29 @@
               <a:cs typeface="Microsoft GothicNeo" panose="020B0500000101010101" pitchFamily="34" charset="-127"/>
               <a:sym typeface="Libre Franklin"/>
             </a:endParaRPr>
+          </a:p>
+          <a:p>
+            <a:pPr marL="0" marR="0" lvl="0" indent="0" algn="l" rtl="0">
+              <a:spcBef>
+                <a:spcPts val="0"/>
+              </a:spcBef>
+              <a:spcAft>
+                <a:spcPts val="0"/>
+              </a:spcAft>
+              <a:buNone/>
+            </a:pPr>
+            <a:r>
+              <a:rPr lang="en-US" sz="2400" dirty="0">
+                <a:solidFill>
+                  <a:schemeClr val="dk1"/>
+                </a:solidFill>
+                <a:latin typeface="Microsoft GothicNeo" panose="020B0500000101010101" pitchFamily="34" charset="-127"/>
+                <a:ea typeface="Microsoft GothicNeo" panose="020B0500000101010101" pitchFamily="34" charset="-127"/>
+                <a:cs typeface="Microsoft GothicNeo" panose="020B0500000101010101" pitchFamily="34" charset="-127"/>
+                <a:sym typeface="Libre Franklin"/>
+              </a:rPr>
+              <a:t>Supervisor: Yap Kim Hui</a:t>
+            </a:r>
           </a:p>
           <a:p>
             <a:pPr marL="0" marR="0" lvl="0" indent="0" algn="l" rtl="0">
@@ -15281,7 +15235,7 @@
           </a:p>
           <a:p>
             <a:r>
-              <a:rPr lang="en-US" altLang="zh-CN" sz="2400" dirty="0" err="1">
+              <a:rPr lang="en-US" altLang="zh-CN" sz="2400" dirty="0">
                 <a:solidFill>
                   <a:schemeClr val="dk1"/>
                 </a:solidFill>
@@ -15290,8 +15244,10 @@
                 <a:cs typeface="Microsoft GothicNeo" panose="020B0500000101010101" pitchFamily="34" charset="-127"/>
                 <a:sym typeface="Libre Franklin"/>
               </a:rPr>
-              <a:t>Teammate:Fang</a:t>
+              <a:t>Teammate:</a:t>
             </a:r>
+          </a:p>
+          <a:p>
             <a:r>
               <a:rPr lang="en-US" altLang="zh-CN" sz="2400" dirty="0">
                 <a:solidFill>
@@ -15302,7 +15258,7 @@
                 <a:cs typeface="Microsoft GothicNeo" panose="020B0500000101010101" pitchFamily="34" charset="-127"/>
                 <a:sym typeface="Libre Franklin"/>
               </a:rPr>
-              <a:t> Yanlin</a:t>
+              <a:t>Fang Yanlin</a:t>
             </a:r>
           </a:p>
           <a:p>
@@ -15592,6 +15548,38 @@
           </a:extLst>
         </p:spPr>
       </p:pic>
+      <p:sp>
+        <p:nvSpPr>
+          <p:cNvPr id="2" name="TextBox 1">
+            <a:extLst>
+              <a:ext uri="{FF2B5EF4-FFF2-40B4-BE49-F238E27FC236}">
+                <a16:creationId xmlns:a16="http://schemas.microsoft.com/office/drawing/2014/main" id="{3230BD89-3A18-2998-C88E-E3209156D239}"/>
+              </a:ext>
+            </a:extLst>
+          </p:cNvPr>
+          <p:cNvSpPr txBox="1"/>
+          <p:nvPr/>
+        </p:nvSpPr>
+        <p:spPr>
+          <a:xfrm>
+            <a:off x="10402067" y="1343984"/>
+            <a:ext cx="184731" cy="307777"/>
+          </a:xfrm>
+          <a:prstGeom prst="rect">
+            <a:avLst/>
+          </a:prstGeom>
+          <a:noFill/>
+        </p:spPr>
+        <p:txBody>
+          <a:bodyPr wrap="none" rtlCol="0">
+            <a:spAutoFit/>
+          </a:bodyPr>
+          <a:lstStyle/>
+          <a:p>
+            <a:endParaRPr lang="zh-CN" altLang="en-US" dirty="0"/>
+          </a:p>
+        </p:txBody>
+      </p:sp>
     </p:spTree>
   </p:cSld>
   <p:clrMapOvr>
@@ -16367,7 +16355,7 @@
                   <a:schemeClr val="accent5"/>
                 </a:solidFill>
               </a:rPr>
-              <a:t>While longer training improves performance on the training set, it can lead to overfitting, which reduces performance on unseen data.</a:t>
+              <a:t>While longer training improves performance on the training dataset, it can lead to overfitting, which reduces performance on unseen data.</a:t>
             </a:r>
           </a:p>
         </p:txBody>
@@ -16753,7 +16741,12 @@
             <p:ph type="body" idx="1"/>
           </p:nvPr>
         </p:nvSpPr>
-        <p:spPr/>
+        <p:spPr>
+          <a:xfrm>
+            <a:off x="594359" y="2281918"/>
+            <a:ext cx="10431450" cy="3708517"/>
+          </a:xfrm>
+        </p:spPr>
         <p:txBody>
           <a:bodyPr/>
           <a:lstStyle/>
@@ -16768,26 +16761,26 @@
               <a:t>We choose </a:t>
             </a:r>
             <a:r>
-              <a:rPr lang="en-US" altLang="zh-CN" dirty="0" err="1">
-                <a:solidFill>
-                  <a:schemeClr val="tx1"/>
-                </a:solidFill>
+              <a:rPr lang="en-US" altLang="zh-CN" b="1" i="0" dirty="0">
+                <a:solidFill>
+                  <a:srgbClr val="1F2328"/>
+                </a:solidFill>
+                <a:effectLst/>
+                <a:latin typeface="-apple-system"/>
+              </a:rPr>
+              <a:t>Task 1: Object Detection in Images from </a:t>
+            </a:r>
+            <a:r>
+              <a:rPr lang="en-US" altLang="zh-CN" b="1" i="0" dirty="0" err="1">
+                <a:solidFill>
+                  <a:srgbClr val="1F2328"/>
+                </a:solidFill>
+                <a:effectLst/>
+                <a:latin typeface="-apple-system"/>
               </a:rPr>
               <a:t>VisDrone</a:t>
             </a:r>
             <a:r>
-              <a:rPr lang="en-US" altLang="zh-CN" dirty="0"/>
-              <a:t> </a:t>
-            </a:r>
-            <a:r>
-              <a:rPr lang="en-US" altLang="zh-CN" dirty="0">
-                <a:solidFill>
-                  <a:schemeClr val="tx1"/>
-                </a:solidFill>
-              </a:rPr>
-              <a:t>dataset </a:t>
-            </a:r>
-            <a:r>
               <a:rPr lang="en-US" altLang="zh-CN" b="1" i="0" dirty="0">
                 <a:solidFill>
                   <a:srgbClr val="1F2328"/>
@@ -16795,7 +16788,7 @@
                 <a:effectLst/>
                 <a:latin typeface="-apple-system"/>
               </a:rPr>
-              <a:t>Task 1: Object Detection in Images</a:t>
+              <a:t> dataset </a:t>
             </a:r>
             <a:endParaRPr lang="en-US" altLang="zh-CN" dirty="0"/>
           </a:p>
@@ -17708,7 +17701,9 @@
           </a:xfrm>
         </p:spPr>
         <p:txBody>
-          <a:bodyPr/>
+          <a:bodyPr>
+            <a:normAutofit lnSpcReduction="10000"/>
+          </a:bodyPr>
           <a:lstStyle/>
           <a:p>
             <a:pPr>
@@ -17747,7 +17742,82 @@
             </a:r>
             <a:r>
               <a:rPr lang="en-US" altLang="zh-CN" dirty="0"/>
-              <a:t>=640 ` pattern</a:t>
+              <a:t>=640 ` to train</a:t>
+            </a:r>
+          </a:p>
+          <a:p>
+            <a:pPr lvl="1">
+              <a:buFontTx/>
+              <a:buChar char="-"/>
+            </a:pPr>
+            <a:r>
+              <a:rPr lang="en-US" altLang="zh-CN" dirty="0">
+                <a:latin typeface="+mn-lt"/>
+              </a:rPr>
+              <a:t>All use `</a:t>
+            </a:r>
+            <a:r>
+              <a:rPr lang="en-US" altLang="zh-CN" dirty="0">
+                <a:solidFill>
+                  <a:schemeClr val="tx1"/>
+                </a:solidFill>
+                <a:latin typeface="+mn-lt"/>
+              </a:rPr>
+              <a:t>yolo detect </a:t>
+            </a:r>
+            <a:r>
+              <a:rPr lang="en-US" altLang="zh-CN" dirty="0" err="1">
+                <a:solidFill>
+                  <a:schemeClr val="tx1"/>
+                </a:solidFill>
+                <a:latin typeface="+mn-lt"/>
+              </a:rPr>
+              <a:t>val</a:t>
+            </a:r>
+            <a:r>
+              <a:rPr lang="en-US" altLang="zh-CN" dirty="0">
+                <a:solidFill>
+                  <a:schemeClr val="tx1"/>
+                </a:solidFill>
+                <a:latin typeface="+mn-lt"/>
+              </a:rPr>
+              <a:t> model=/home/users/ntu/khu005/scratch/project/yolo11*/runs/detect/train/weights/best.pt data=</a:t>
+            </a:r>
+            <a:r>
+              <a:rPr lang="en-US" altLang="zh-CN" dirty="0" err="1">
+                <a:solidFill>
+                  <a:schemeClr val="tx1"/>
+                </a:solidFill>
+                <a:latin typeface="+mn-lt"/>
+              </a:rPr>
+              <a:t>VisDrone-test.yaml</a:t>
+            </a:r>
+            <a:r>
+              <a:rPr lang="en-US" altLang="zh-CN" dirty="0">
+                <a:solidFill>
+                  <a:schemeClr val="tx1"/>
+                </a:solidFill>
+                <a:latin typeface="+mn-lt"/>
+              </a:rPr>
+              <a:t> batch=64 epochs=100 device=0,1,2,3 </a:t>
+            </a:r>
+            <a:r>
+              <a:rPr lang="en-US" altLang="zh-CN" dirty="0" err="1">
+                <a:solidFill>
+                  <a:schemeClr val="tx1"/>
+                </a:solidFill>
+                <a:latin typeface="+mn-lt"/>
+              </a:rPr>
+              <a:t>imgsz</a:t>
+            </a:r>
+            <a:r>
+              <a:rPr lang="en-US" altLang="zh-CN" dirty="0">
+                <a:solidFill>
+                  <a:schemeClr val="tx1"/>
+                </a:solidFill>
+                <a:latin typeface="+mn-lt"/>
+              </a:rPr>
+              <a:t>=640` to test</a:t>
             </a:r>
           </a:p>
           <a:p>
@@ -17771,7 +17841,7 @@
             </a:pPr>
             <a:r>
               <a:rPr lang="en-US" altLang="zh-CN" dirty="0"/>
-              <a:t> change to epochs=200 </a:t>
+              <a:t> change training epochs to 200 </a:t>
             </a:r>
           </a:p>
         </p:txBody>

</xml_diff>